<commit_message>
[upd] full architect image in pptx
</commit_message>
<xml_diff>
--- a/презентация.pptx
+++ b/презентация.pptx
@@ -282,7 +282,7 @@
           <a:p>
             <a:fld id="{1D8BD707-D9CF-40AE-B4C6-C98DA3205C09}" type="datetimeFigureOut">
               <a:rPr lang="en-US" smtClean="0"/>
-              <a:t>5/11/22</a:t>
+              <a:t>5/20/22</a:t>
             </a:fld>
             <a:endParaRPr lang="en-US"/>
           </a:p>
@@ -480,7 +480,7 @@
           <a:p>
             <a:fld id="{1D8BD707-D9CF-40AE-B4C6-C98DA3205C09}" type="datetimeFigureOut">
               <a:rPr lang="en-US" smtClean="0"/>
-              <a:t>5/11/22</a:t>
+              <a:t>5/20/22</a:t>
             </a:fld>
             <a:endParaRPr lang="en-US"/>
           </a:p>
@@ -688,7 +688,7 @@
           <a:p>
             <a:fld id="{1D8BD707-D9CF-40AE-B4C6-C98DA3205C09}" type="datetimeFigureOut">
               <a:rPr lang="en-US" smtClean="0"/>
-              <a:t>5/11/22</a:t>
+              <a:t>5/20/22</a:t>
             </a:fld>
             <a:endParaRPr lang="en-US"/>
           </a:p>
@@ -834,7 +834,7 @@
           <a:p>
             <a:fld id="{1D8BD707-D9CF-40AE-B4C6-C98DA3205C09}" type="datetimeFigureOut">
               <a:rPr lang="en-US"/>
-              <a:t>5/11/22</a:t>
+              <a:t>5/20/22</a:t>
             </a:fld>
             <a:endParaRPr lang="en-US"/>
           </a:p>
@@ -987,7 +987,7 @@
           <a:p>
             <a:fld id="{1D8BD707-D9CF-40AE-B4C6-C98DA3205C09}" type="datetimeFigureOut">
               <a:rPr lang="en-US"/>
-              <a:t>5/11/22</a:t>
+              <a:t>5/20/22</a:t>
             </a:fld>
             <a:endParaRPr lang="en-US"/>
           </a:p>
@@ -1163,7 +1163,7 @@
           <a:p>
             <a:fld id="{1D8BD707-D9CF-40AE-B4C6-C98DA3205C09}" type="datetimeFigureOut">
               <a:rPr lang="en-US" smtClean="0"/>
-              <a:t>5/11/22</a:t>
+              <a:t>5/20/22</a:t>
             </a:fld>
             <a:endParaRPr lang="en-US"/>
           </a:p>
@@ -1438,7 +1438,7 @@
           <a:p>
             <a:fld id="{1D8BD707-D9CF-40AE-B4C6-C98DA3205C09}" type="datetimeFigureOut">
               <a:rPr lang="en-US" smtClean="0"/>
-              <a:t>5/11/22</a:t>
+              <a:t>5/20/22</a:t>
             </a:fld>
             <a:endParaRPr lang="en-US"/>
           </a:p>
@@ -1703,7 +1703,7 @@
           <a:p>
             <a:fld id="{1D8BD707-D9CF-40AE-B4C6-C98DA3205C09}" type="datetimeFigureOut">
               <a:rPr lang="en-US" smtClean="0"/>
-              <a:t>5/11/22</a:t>
+              <a:t>5/20/22</a:t>
             </a:fld>
             <a:endParaRPr lang="en-US"/>
           </a:p>
@@ -2115,7 +2115,7 @@
           <a:p>
             <a:fld id="{1D8BD707-D9CF-40AE-B4C6-C98DA3205C09}" type="datetimeFigureOut">
               <a:rPr lang="en-US" smtClean="0"/>
-              <a:t>5/11/22</a:t>
+              <a:t>5/20/22</a:t>
             </a:fld>
             <a:endParaRPr lang="en-US"/>
           </a:p>
@@ -2256,7 +2256,7 @@
           <a:p>
             <a:fld id="{1D8BD707-D9CF-40AE-B4C6-C98DA3205C09}" type="datetimeFigureOut">
               <a:rPr lang="en-US" smtClean="0"/>
-              <a:t>5/11/22</a:t>
+              <a:t>5/20/22</a:t>
             </a:fld>
             <a:endParaRPr lang="en-US"/>
           </a:p>
@@ -2369,7 +2369,7 @@
           <a:p>
             <a:fld id="{1D8BD707-D9CF-40AE-B4C6-C98DA3205C09}" type="datetimeFigureOut">
               <a:rPr lang="en-US" smtClean="0"/>
-              <a:t>5/11/22</a:t>
+              <a:t>5/20/22</a:t>
             </a:fld>
             <a:endParaRPr lang="en-US"/>
           </a:p>
@@ -2680,7 +2680,7 @@
           <a:p>
             <a:fld id="{1D8BD707-D9CF-40AE-B4C6-C98DA3205C09}" type="datetimeFigureOut">
               <a:rPr lang="en-US" smtClean="0"/>
-              <a:t>5/11/22</a:t>
+              <a:t>5/20/22</a:t>
             </a:fld>
             <a:endParaRPr lang="en-US"/>
           </a:p>
@@ -2968,7 +2968,7 @@
           <a:p>
             <a:fld id="{1D8BD707-D9CF-40AE-B4C6-C98DA3205C09}" type="datetimeFigureOut">
               <a:rPr lang="en-US" smtClean="0"/>
-              <a:t>5/11/22</a:t>
+              <a:t>5/20/22</a:t>
             </a:fld>
             <a:endParaRPr lang="en-US"/>
           </a:p>
@@ -3239,7 +3239,7 @@
           <a:p>
             <a:fld id="{1D8BD707-D9CF-40AE-B4C6-C98DA3205C09}" type="datetimeFigureOut">
               <a:rPr lang="en-US" smtClean="0"/>
-              <a:t>5/11/22</a:t>
+              <a:t>5/20/22</a:t>
             </a:fld>
             <a:endParaRPr lang="en-US"/>
           </a:p>
@@ -8361,35 +8361,14 @@
               </a:spcBef>
             </a:pPr>
             <a:r>
-              <a:rPr sz="6000" spc="290" dirty="0">
-                <a:latin typeface=""/>
-              </a:rPr>
-              <a:t>Р</a:t>
-            </a:r>
-            <a:r>
-              <a:rPr sz="6000" spc="300" dirty="0">
-                <a:latin typeface=""/>
-              </a:rPr>
-              <a:t>ы</a:t>
-            </a:r>
-            <a:r>
-              <a:rPr sz="6000" spc="140" dirty="0">
-                <a:latin typeface=""/>
-              </a:rPr>
-              <a:t>н</a:t>
-            </a:r>
-            <a:r>
-              <a:rPr sz="6000" spc="70" dirty="0">
-                <a:latin typeface=""/>
-              </a:rPr>
-              <a:t>о</a:t>
-            </a:r>
-            <a:r>
-              <a:rPr sz="6000" spc="-30" dirty="0">
-                <a:latin typeface=""/>
-              </a:rPr>
-              <a:t>к</a:t>
-            </a:r>
+              <a:rPr lang="ru-RU" sz="6000" spc="290" dirty="0">
+                <a:latin typeface=""/>
+              </a:rPr>
+              <a:t>Анализ рынка</a:t>
+            </a:r>
+            <a:endParaRPr sz="6000" spc="-30" dirty="0">
+              <a:latin typeface=""/>
+            </a:endParaRPr>
           </a:p>
         </p:txBody>
       </p:sp>
@@ -13995,28 +13974,6 @@
           </a:p>
         </p:txBody>
       </p:sp>
-      <p:pic>
-        <p:nvPicPr>
-          <p:cNvPr id="7" name="object 7"/>
-          <p:cNvPicPr/>
-          <p:nvPr/>
-        </p:nvPicPr>
-        <p:blipFill>
-          <a:blip r:embed="rId2" cstate="print"/>
-          <a:stretch>
-            <a:fillRect/>
-          </a:stretch>
-        </p:blipFill>
-        <p:spPr>
-          <a:xfrm>
-            <a:off x="572034" y="2257426"/>
-            <a:ext cx="17325974" cy="7000874"/>
-          </a:xfrm>
-          <a:prstGeom prst="rect">
-            <a:avLst/>
-          </a:prstGeom>
-        </p:spPr>
-      </p:pic>
       <p:sp>
         <p:nvSpPr>
           <p:cNvPr id="2" name="object 2"/>
@@ -14230,6 +14187,42 @@
           </a:p>
         </p:txBody>
       </p:sp>
+      <p:pic>
+        <p:nvPicPr>
+          <p:cNvPr id="11" name="Рисунок 10">
+            <a:extLst>
+              <a:ext uri="{FF2B5EF4-FFF2-40B4-BE49-F238E27FC236}">
+                <a16:creationId xmlns:a16="http://schemas.microsoft.com/office/drawing/2014/main" id="{2E234F46-FFA9-4A4F-97D6-B0D95E682309}"/>
+              </a:ext>
+            </a:extLst>
+          </p:cNvPr>
+          <p:cNvPicPr>
+            <a:picLocks noChangeAspect="1"/>
+          </p:cNvPicPr>
+          <p:nvPr/>
+        </p:nvPicPr>
+        <p:blipFill>
+          <a:blip r:embed="rId2">
+            <a:extLst>
+              <a:ext uri="{28A0092B-C50C-407E-A947-70E740481C1C}">
+                <a14:useLocalDpi xmlns:a14="http://schemas.microsoft.com/office/drawing/2010/main" val="0"/>
+              </a:ext>
+            </a:extLst>
+          </a:blip>
+          <a:stretch>
+            <a:fillRect/>
+          </a:stretch>
+        </p:blipFill>
+        <p:spPr>
+          <a:xfrm>
+            <a:off x="1054100" y="1943100"/>
+            <a:ext cx="16179800" cy="8343900"/>
+          </a:xfrm>
+          <a:prstGeom prst="rect">
+            <a:avLst/>
+          </a:prstGeom>
+        </p:spPr>
+      </p:pic>
     </p:spTree>
   </p:cSld>
   <p:clrMapOvr>
@@ -15483,8 +15476,8 @@
         </p:nvSpPr>
         <p:spPr>
           <a:xfrm>
-            <a:off x="0" y="219025"/>
-            <a:ext cx="18287999" cy="939800"/>
+            <a:off x="0" y="-190500"/>
+            <a:ext cx="18287999" cy="1859483"/>
           </a:xfrm>
           <a:prstGeom prst="rect">
             <a:avLst/>
@@ -15525,13 +15518,58 @@
               <a:t> </a:t>
             </a:r>
             <a:r>
-              <a:rPr sz="6000" spc="-80" dirty="0">
+              <a:rPr sz="6000" spc="-80" dirty="0" err="1">
                 <a:solidFill>
                   <a:schemeClr val="tx1"/>
                 </a:solidFill>
                 <a:latin typeface=""/>
               </a:rPr>
-              <a:t>классификатор</a:t>
+              <a:t>клас</a:t>
+            </a:r>
+            <a:r>
+              <a:rPr lang="ru-RU" sz="6000" spc="-80" dirty="0">
+                <a:solidFill>
+                  <a:schemeClr val="tx1"/>
+                </a:solidFill>
+                <a:latin typeface=""/>
+              </a:rPr>
+              <a:t>с</a:t>
+            </a:r>
+            <a:r>
+              <a:rPr sz="6000" spc="-80" dirty="0" err="1">
+                <a:solidFill>
+                  <a:schemeClr val="tx1"/>
+                </a:solidFill>
+                <a:latin typeface=""/>
+              </a:rPr>
+              <a:t>ификатор</a:t>
+            </a:r>
+            <a:r>
+              <a:rPr lang="ru-RU" sz="6000" spc="-80" dirty="0">
+                <a:solidFill>
+                  <a:schemeClr val="tx1"/>
+                </a:solidFill>
+                <a:latin typeface=""/>
+              </a:rPr>
+              <a:t> для </a:t>
+            </a:r>
+            <a:r>
+              <a:rPr lang="ru-RU" sz="6000" spc="-80" dirty="0" err="1">
+                <a:solidFill>
+                  <a:schemeClr val="tx1"/>
+                </a:solidFill>
+                <a:latin typeface=""/>
+              </a:rPr>
+              <a:t>валидации</a:t>
+            </a:r>
+            <a:r>
+              <a:rPr lang="ru-RU" sz="6000" spc="-80" dirty="0">
+                <a:solidFill>
+                  <a:schemeClr val="tx1"/>
+                </a:solidFill>
+                <a:latin typeface=""/>
+              </a:rPr>
+              <a:t> данных об организации</a:t>
             </a:r>
             <a:endParaRPr sz="6000" dirty="0">
               <a:solidFill>

</xml_diff>